<commit_message>
update architecture picture & add implementation of CRAQ
</commit_message>
<xml_diff>
--- a/presentation/DNS_strong_consistency.pptx
+++ b/presentation/DNS_strong_consistency.pptx
@@ -269,7 +269,7 @@
           <a:p>
             <a:fld id="{2A243E5B-601F-4596-B5CF-EDE3DA636748}" type="datetimeFigureOut">
               <a:rPr lang="zh-CN" altLang="en-US" smtClean="0"/>
-              <a:t>2021/11/17</a:t>
+              <a:t>2021/11/20</a:t>
             </a:fld>
             <a:endParaRPr lang="zh-CN" altLang="en-US"/>
           </a:p>
@@ -467,7 +467,7 @@
           <a:p>
             <a:fld id="{2A243E5B-601F-4596-B5CF-EDE3DA636748}" type="datetimeFigureOut">
               <a:rPr lang="zh-CN" altLang="en-US" smtClean="0"/>
-              <a:t>2021/11/17</a:t>
+              <a:t>2021/11/20</a:t>
             </a:fld>
             <a:endParaRPr lang="zh-CN" altLang="en-US"/>
           </a:p>
@@ -675,7 +675,7 @@
           <a:p>
             <a:fld id="{2A243E5B-601F-4596-B5CF-EDE3DA636748}" type="datetimeFigureOut">
               <a:rPr lang="zh-CN" altLang="en-US" smtClean="0"/>
-              <a:t>2021/11/17</a:t>
+              <a:t>2021/11/20</a:t>
             </a:fld>
             <a:endParaRPr lang="zh-CN" altLang="en-US"/>
           </a:p>
@@ -873,7 +873,7 @@
           <a:p>
             <a:fld id="{2A243E5B-601F-4596-B5CF-EDE3DA636748}" type="datetimeFigureOut">
               <a:rPr lang="zh-CN" altLang="en-US" smtClean="0"/>
-              <a:t>2021/11/17</a:t>
+              <a:t>2021/11/20</a:t>
             </a:fld>
             <a:endParaRPr lang="zh-CN" altLang="en-US"/>
           </a:p>
@@ -1148,7 +1148,7 @@
           <a:p>
             <a:fld id="{2A243E5B-601F-4596-B5CF-EDE3DA636748}" type="datetimeFigureOut">
               <a:rPr lang="zh-CN" altLang="en-US" smtClean="0"/>
-              <a:t>2021/11/17</a:t>
+              <a:t>2021/11/20</a:t>
             </a:fld>
             <a:endParaRPr lang="zh-CN" altLang="en-US"/>
           </a:p>
@@ -1413,7 +1413,7 @@
           <a:p>
             <a:fld id="{2A243E5B-601F-4596-B5CF-EDE3DA636748}" type="datetimeFigureOut">
               <a:rPr lang="zh-CN" altLang="en-US" smtClean="0"/>
-              <a:t>2021/11/17</a:t>
+              <a:t>2021/11/20</a:t>
             </a:fld>
             <a:endParaRPr lang="zh-CN" altLang="en-US"/>
           </a:p>
@@ -1825,7 +1825,7 @@
           <a:p>
             <a:fld id="{2A243E5B-601F-4596-B5CF-EDE3DA636748}" type="datetimeFigureOut">
               <a:rPr lang="zh-CN" altLang="en-US" smtClean="0"/>
-              <a:t>2021/11/17</a:t>
+              <a:t>2021/11/20</a:t>
             </a:fld>
             <a:endParaRPr lang="zh-CN" altLang="en-US"/>
           </a:p>
@@ -1966,7 +1966,7 @@
           <a:p>
             <a:fld id="{2A243E5B-601F-4596-B5CF-EDE3DA636748}" type="datetimeFigureOut">
               <a:rPr lang="zh-CN" altLang="en-US" smtClean="0"/>
-              <a:t>2021/11/17</a:t>
+              <a:t>2021/11/20</a:t>
             </a:fld>
             <a:endParaRPr lang="zh-CN" altLang="en-US"/>
           </a:p>
@@ -2079,7 +2079,7 @@
           <a:p>
             <a:fld id="{2A243E5B-601F-4596-B5CF-EDE3DA636748}" type="datetimeFigureOut">
               <a:rPr lang="zh-CN" altLang="en-US" smtClean="0"/>
-              <a:t>2021/11/17</a:t>
+              <a:t>2021/11/20</a:t>
             </a:fld>
             <a:endParaRPr lang="zh-CN" altLang="en-US"/>
           </a:p>
@@ -2390,7 +2390,7 @@
           <a:p>
             <a:fld id="{2A243E5B-601F-4596-B5CF-EDE3DA636748}" type="datetimeFigureOut">
               <a:rPr lang="zh-CN" altLang="en-US" smtClean="0"/>
-              <a:t>2021/11/17</a:t>
+              <a:t>2021/11/20</a:t>
             </a:fld>
             <a:endParaRPr lang="zh-CN" altLang="en-US"/>
           </a:p>
@@ -2678,7 +2678,7 @@
           <a:p>
             <a:fld id="{2A243E5B-601F-4596-B5CF-EDE3DA636748}" type="datetimeFigureOut">
               <a:rPr lang="zh-CN" altLang="en-US" smtClean="0"/>
-              <a:t>2021/11/17</a:t>
+              <a:t>2021/11/20</a:t>
             </a:fld>
             <a:endParaRPr lang="zh-CN" altLang="en-US"/>
           </a:p>
@@ -2919,7 +2919,7 @@
           <a:p>
             <a:fld id="{2A243E5B-601F-4596-B5CF-EDE3DA636748}" type="datetimeFigureOut">
               <a:rPr lang="zh-CN" altLang="en-US" smtClean="0"/>
-              <a:t>2021/11/17</a:t>
+              <a:t>2021/11/20</a:t>
             </a:fld>
             <a:endParaRPr lang="zh-CN" altLang="en-US"/>
           </a:p>
@@ -4247,10 +4247,10 @@
       </p:sp>
       <p:pic>
         <p:nvPicPr>
-          <p:cNvPr id="5" name="内容占位符 4">
-            <a:extLst>
-              <a:ext uri="{FF2B5EF4-FFF2-40B4-BE49-F238E27FC236}">
-                <a16:creationId xmlns:a16="http://schemas.microsoft.com/office/drawing/2014/main" id="{2A6CFBF2-7B8C-43BD-A370-5D022352B5AB}"/>
+          <p:cNvPr id="7" name="内容占位符 6">
+            <a:extLst>
+              <a:ext uri="{FF2B5EF4-FFF2-40B4-BE49-F238E27FC236}">
+                <a16:creationId xmlns:a16="http://schemas.microsoft.com/office/drawing/2014/main" id="{9388238E-3797-4ABC-866B-95C3D493C756}"/>
               </a:ext>
             </a:extLst>
           </p:cNvPr>
@@ -4275,8 +4275,8 @@
         </p:blipFill>
         <p:spPr>
           <a:xfrm>
-            <a:off x="999482" y="487566"/>
-            <a:ext cx="10193035" cy="6364824"/>
+            <a:off x="1178062" y="364638"/>
+            <a:ext cx="9968642" cy="6493362"/>
           </a:xfrm>
         </p:spPr>
       </p:pic>

</xml_diff>

<commit_message>
update pre slides and add paper
</commit_message>
<xml_diff>
--- a/presentation/DNS_strong_consistency.pptx
+++ b/presentation/DNS_strong_consistency.pptx
@@ -269,7 +269,7 @@
           <a:p>
             <a:fld id="{2A243E5B-601F-4596-B5CF-EDE3DA636748}" type="datetimeFigureOut">
               <a:rPr lang="zh-CN" altLang="en-US" smtClean="0"/>
-              <a:t>2021/11/21</a:t>
+              <a:t>2021/11/22</a:t>
             </a:fld>
             <a:endParaRPr lang="zh-CN" altLang="en-US"/>
           </a:p>
@@ -467,7 +467,7 @@
           <a:p>
             <a:fld id="{2A243E5B-601F-4596-B5CF-EDE3DA636748}" type="datetimeFigureOut">
               <a:rPr lang="zh-CN" altLang="en-US" smtClean="0"/>
-              <a:t>2021/11/21</a:t>
+              <a:t>2021/11/22</a:t>
             </a:fld>
             <a:endParaRPr lang="zh-CN" altLang="en-US"/>
           </a:p>
@@ -675,7 +675,7 @@
           <a:p>
             <a:fld id="{2A243E5B-601F-4596-B5CF-EDE3DA636748}" type="datetimeFigureOut">
               <a:rPr lang="zh-CN" altLang="en-US" smtClean="0"/>
-              <a:t>2021/11/21</a:t>
+              <a:t>2021/11/22</a:t>
             </a:fld>
             <a:endParaRPr lang="zh-CN" altLang="en-US"/>
           </a:p>
@@ -873,7 +873,7 @@
           <a:p>
             <a:fld id="{2A243E5B-601F-4596-B5CF-EDE3DA636748}" type="datetimeFigureOut">
               <a:rPr lang="zh-CN" altLang="en-US" smtClean="0"/>
-              <a:t>2021/11/21</a:t>
+              <a:t>2021/11/22</a:t>
             </a:fld>
             <a:endParaRPr lang="zh-CN" altLang="en-US"/>
           </a:p>
@@ -1148,7 +1148,7 @@
           <a:p>
             <a:fld id="{2A243E5B-601F-4596-B5CF-EDE3DA636748}" type="datetimeFigureOut">
               <a:rPr lang="zh-CN" altLang="en-US" smtClean="0"/>
-              <a:t>2021/11/21</a:t>
+              <a:t>2021/11/22</a:t>
             </a:fld>
             <a:endParaRPr lang="zh-CN" altLang="en-US"/>
           </a:p>
@@ -1413,7 +1413,7 @@
           <a:p>
             <a:fld id="{2A243E5B-601F-4596-B5CF-EDE3DA636748}" type="datetimeFigureOut">
               <a:rPr lang="zh-CN" altLang="en-US" smtClean="0"/>
-              <a:t>2021/11/21</a:t>
+              <a:t>2021/11/22</a:t>
             </a:fld>
             <a:endParaRPr lang="zh-CN" altLang="en-US"/>
           </a:p>
@@ -1825,7 +1825,7 @@
           <a:p>
             <a:fld id="{2A243E5B-601F-4596-B5CF-EDE3DA636748}" type="datetimeFigureOut">
               <a:rPr lang="zh-CN" altLang="en-US" smtClean="0"/>
-              <a:t>2021/11/21</a:t>
+              <a:t>2021/11/22</a:t>
             </a:fld>
             <a:endParaRPr lang="zh-CN" altLang="en-US"/>
           </a:p>
@@ -1966,7 +1966,7 @@
           <a:p>
             <a:fld id="{2A243E5B-601F-4596-B5CF-EDE3DA636748}" type="datetimeFigureOut">
               <a:rPr lang="zh-CN" altLang="en-US" smtClean="0"/>
-              <a:t>2021/11/21</a:t>
+              <a:t>2021/11/22</a:t>
             </a:fld>
             <a:endParaRPr lang="zh-CN" altLang="en-US"/>
           </a:p>
@@ -2079,7 +2079,7 @@
           <a:p>
             <a:fld id="{2A243E5B-601F-4596-B5CF-EDE3DA636748}" type="datetimeFigureOut">
               <a:rPr lang="zh-CN" altLang="en-US" smtClean="0"/>
-              <a:t>2021/11/21</a:t>
+              <a:t>2021/11/22</a:t>
             </a:fld>
             <a:endParaRPr lang="zh-CN" altLang="en-US"/>
           </a:p>
@@ -2390,7 +2390,7 @@
           <a:p>
             <a:fld id="{2A243E5B-601F-4596-B5CF-EDE3DA636748}" type="datetimeFigureOut">
               <a:rPr lang="zh-CN" altLang="en-US" smtClean="0"/>
-              <a:t>2021/11/21</a:t>
+              <a:t>2021/11/22</a:t>
             </a:fld>
             <a:endParaRPr lang="zh-CN" altLang="en-US"/>
           </a:p>
@@ -2678,7 +2678,7 @@
           <a:p>
             <a:fld id="{2A243E5B-601F-4596-B5CF-EDE3DA636748}" type="datetimeFigureOut">
               <a:rPr lang="zh-CN" altLang="en-US" smtClean="0"/>
-              <a:t>2021/11/21</a:t>
+              <a:t>2021/11/22</a:t>
             </a:fld>
             <a:endParaRPr lang="zh-CN" altLang="en-US"/>
           </a:p>
@@ -2919,7 +2919,7 @@
           <a:p>
             <a:fld id="{2A243E5B-601F-4596-B5CF-EDE3DA636748}" type="datetimeFigureOut">
               <a:rPr lang="zh-CN" altLang="en-US" smtClean="0"/>
-              <a:t>2021/11/21</a:t>
+              <a:t>2021/11/22</a:t>
             </a:fld>
             <a:endParaRPr lang="zh-CN" altLang="en-US"/>
           </a:p>
@@ -3393,6 +3393,16 @@
           <a:bodyPr/>
           <a:lstStyle/>
           <a:p>
+            <a:r>
+              <a:rPr lang="en-US" altLang="zh-CN"/>
+              <a:t>Yuhan Zhou  Wenrui Liu  Xiaolong Huang</a:t>
+            </a:r>
+          </a:p>
+          <a:p>
+            <a:r>
+              <a:rPr lang="en-US" altLang="zh-CN"/>
+              <a:t>November 22, 2021</a:t>
+            </a:r>
             <a:endParaRPr lang="zh-CN" altLang="en-US"/>
           </a:p>
         </p:txBody>
@@ -3480,7 +3490,7 @@
           <a:p>
             <a:r>
               <a:rPr lang="en-US" altLang="zh-CN"/>
-              <a:t>Zhou Yuhan </a:t>
+              <a:t>Yuhan Zhou </a:t>
             </a:r>
             <a:r>
               <a:rPr lang="en-US" altLang="zh-CN">
@@ -3493,7 +3503,7 @@
           <a:p>
             <a:r>
               <a:rPr lang="en-US" altLang="zh-CN"/>
-              <a:t>Liu Wenrui </a:t>
+              <a:t>Wenrui Liu </a:t>
             </a:r>
             <a:r>
               <a:rPr lang="en-US" altLang="zh-CN">
@@ -3506,7 +3516,7 @@
           <a:p>
             <a:r>
               <a:rPr lang="en-US" altLang="zh-CN"/>
-              <a:t>Huang Xiaolong </a:t>
+              <a:t>Xiaolong Huang </a:t>
             </a:r>
             <a:r>
               <a:rPr lang="en-US" altLang="zh-CN">

</xml_diff>